<commit_message>
Update U7S1 - Intro to Dimensioning.pptx
</commit_message>
<xml_diff>
--- a/High School/Design and Drawing for Production/Unit 7 - Dimensioning/Section 1 - Intro to Dimensioning/Assets/U7S1 - Intro to Dimensioning.pptx
+++ b/High School/Design and Drawing for Production/Unit 7 - Dimensioning/Section 1 - Intro to Dimensioning/Assets/U7S1 - Intro to Dimensioning.pptx
@@ -5,15 +5,17 @@
     <p:sldMasterId id="2147483735" r:id="rId1"/>
   </p:sldMasterIdLst>
   <p:notesMasterIdLst>
-    <p:notesMasterId r:id="rId5"/>
+    <p:notesMasterId r:id="rId7"/>
   </p:notesMasterIdLst>
   <p:handoutMasterIdLst>
-    <p:handoutMasterId r:id="rId6"/>
+    <p:handoutMasterId r:id="rId8"/>
   </p:handoutMasterIdLst>
   <p:sldIdLst>
     <p:sldId id="268" r:id="rId2"/>
     <p:sldId id="271" r:id="rId3"/>
     <p:sldId id="272" r:id="rId4"/>
+    <p:sldId id="273" r:id="rId5"/>
+    <p:sldId id="274" r:id="rId6"/>
   </p:sldIdLst>
   <p:sldSz cx="12192000" cy="6858000"/>
   <p:notesSz cx="6858000" cy="9144000"/>
@@ -216,7 +218,7 @@
           <a:p>
             <a:fld id="{6AC4FB8F-ED15-48AB-97BD-17129D4E699D}" type="datetimeFigureOut">
               <a:rPr lang="en-US" smtClean="0"/>
-              <a:t>1/8/20</a:t>
+              <a:t>1/8/2020</a:t>
             </a:fld>
             <a:endParaRPr lang="en-US" dirty="0"/>
           </a:p>
@@ -381,7 +383,7 @@
           <a:p>
             <a:fld id="{BBC9D437-CD83-4825-AD0D-5E7B341BC79B}" type="datetimeFigureOut">
               <a:rPr lang="en-US" smtClean="0"/>
-              <a:t>1/8/20</a:t>
+              <a:t>1/8/2020</a:t>
             </a:fld>
             <a:endParaRPr lang="en-US" dirty="0"/>
           </a:p>
@@ -839,7 +841,7 @@
           <a:p>
             <a:fld id="{85AB7CBB-843F-464A-A764-71D6ADC27CFA}" type="datetime1">
               <a:rPr lang="en-US" smtClean="0"/>
-              <a:t>1/8/20</a:t>
+              <a:t>1/8/2020</a:t>
             </a:fld>
             <a:endParaRPr lang="en-US" dirty="0"/>
           </a:p>
@@ -1292,7 +1294,7 @@
           <a:p>
             <a:fld id="{3F138946-C5C1-4A11-BA69-F12F43F8A94B}" type="datetime1">
               <a:rPr lang="en-US" smtClean="0"/>
-              <a:t>1/8/20</a:t>
+              <a:t>1/8/2020</a:t>
             </a:fld>
             <a:endParaRPr lang="en-US" dirty="0"/>
           </a:p>
@@ -1548,7 +1550,7 @@
           <a:p>
             <a:fld id="{3F138946-C5C1-4A11-BA69-F12F43F8A94B}" type="datetime1">
               <a:rPr lang="en-US" smtClean="0"/>
-              <a:t>1/8/20</a:t>
+              <a:t>1/8/2020</a:t>
             </a:fld>
             <a:endParaRPr lang="en-US" dirty="0"/>
           </a:p>
@@ -1862,7 +1864,7 @@
           <a:p>
             <a:fld id="{3F138946-C5C1-4A11-BA69-F12F43F8A94B}" type="datetime1">
               <a:rPr lang="en-US" smtClean="0"/>
-              <a:t>1/8/20</a:t>
+              <a:t>1/8/2020</a:t>
             </a:fld>
             <a:endParaRPr lang="en-US" dirty="0"/>
           </a:p>
@@ -2186,7 +2188,7 @@
           <a:p>
             <a:fld id="{3F138946-C5C1-4A11-BA69-F12F43F8A94B}" type="datetime1">
               <a:rPr lang="en-US" smtClean="0"/>
-              <a:t>1/8/20</a:t>
+              <a:t>1/8/2020</a:t>
             </a:fld>
             <a:endParaRPr lang="en-US" dirty="0"/>
           </a:p>
@@ -2494,7 +2496,7 @@
           <a:p>
             <a:fld id="{3F138946-C5C1-4A11-BA69-F12F43F8A94B}" type="datetime1">
               <a:rPr lang="en-US" smtClean="0"/>
-              <a:t>1/8/20</a:t>
+              <a:t>1/8/2020</a:t>
             </a:fld>
             <a:endParaRPr lang="en-US" dirty="0"/>
           </a:p>
@@ -2867,7 +2869,7 @@
           <a:p>
             <a:fld id="{3F138946-C5C1-4A11-BA69-F12F43F8A94B}" type="datetime1">
               <a:rPr lang="en-US" smtClean="0"/>
-              <a:t>1/8/20</a:t>
+              <a:t>1/8/2020</a:t>
             </a:fld>
             <a:endParaRPr lang="en-US" dirty="0"/>
           </a:p>
@@ -3047,7 +3049,7 @@
           <a:p>
             <a:fld id="{CBEFC03D-3A1F-4813-9337-02411FCC3A9A}" type="datetime1">
               <a:rPr lang="en-US" smtClean="0"/>
-              <a:t>1/8/20</a:t>
+              <a:t>1/8/2020</a:t>
             </a:fld>
             <a:endParaRPr lang="en-US" dirty="0"/>
           </a:p>
@@ -3243,7 +3245,7 @@
           <a:p>
             <a:fld id="{3D638F79-DFA0-4C26-9553-23A017B69AB6}" type="datetime1">
               <a:rPr lang="en-US" smtClean="0"/>
-              <a:t>1/8/20</a:t>
+              <a:t>1/8/2020</a:t>
             </a:fld>
             <a:endParaRPr lang="en-US" dirty="0"/>
           </a:p>
@@ -3354,7 +3356,7 @@
           <a:p>
             <a:fld id="{AA615CA6-EC4D-4728-8AA6-534BE7E9B67C}" type="datetime1">
               <a:rPr lang="en-US" smtClean="0"/>
-              <a:t>1/8/20</a:t>
+              <a:t>1/8/2020</a:t>
             </a:fld>
             <a:endParaRPr lang="en-US" dirty="0"/>
           </a:p>
@@ -3539,7 +3541,7 @@
           <a:p>
             <a:fld id="{A70B34E7-E1D9-4FBF-A1A0-4009669A00BF}" type="datetime1">
               <a:rPr lang="en-US" smtClean="0"/>
-              <a:t>1/8/20</a:t>
+              <a:t>1/8/2020</a:t>
             </a:fld>
             <a:endParaRPr lang="en-US" dirty="0"/>
           </a:p>
@@ -3806,7 +3808,7 @@
           <a:p>
             <a:fld id="{C50FD434-5945-4FAF-A8C0-DAE9905532CE}" type="datetimeFigureOut">
               <a:rPr lang="en-US" smtClean="0"/>
-              <a:t>1/8/20</a:t>
+              <a:t>1/8/2020</a:t>
             </a:fld>
             <a:endParaRPr lang="en-US"/>
           </a:p>
@@ -4054,7 +4056,7 @@
           <a:p>
             <a:fld id="{7579E8B6-2F47-420B-83EA-EB2285D13EC9}" type="datetime1">
               <a:rPr lang="en-US" smtClean="0"/>
-              <a:t>1/8/20</a:t>
+              <a:t>1/8/2020</a:t>
             </a:fld>
             <a:endParaRPr lang="en-US" dirty="0"/>
           </a:p>
@@ -4452,7 +4454,7 @@
           <a:p>
             <a:fld id="{2304803D-B10E-4B90-8456-A0E05393E233}" type="datetime1">
               <a:rPr lang="en-US" smtClean="0"/>
-              <a:t>1/8/20</a:t>
+              <a:t>1/8/2020</a:t>
             </a:fld>
             <a:endParaRPr lang="en-US" dirty="0"/>
           </a:p>
@@ -4586,7 +4588,7 @@
           <a:p>
             <a:fld id="{CCE1E62F-6CCE-4064-96C2-2084AF883904}" type="datetime1">
               <a:rPr lang="en-US" smtClean="0"/>
-              <a:t>1/8/20</a:t>
+              <a:t>1/8/2020</a:t>
             </a:fld>
             <a:endParaRPr lang="en-US" dirty="0"/>
           </a:p>
@@ -4697,7 +4699,7 @@
           <a:p>
             <a:fld id="{AA615CA6-EC4D-4728-8AA6-534BE7E9B67C}" type="datetime1">
               <a:rPr lang="en-US" smtClean="0"/>
-              <a:t>1/8/20</a:t>
+              <a:t>1/8/2020</a:t>
             </a:fld>
             <a:endParaRPr lang="en-US" dirty="0"/>
           </a:p>
@@ -4968,7 +4970,7 @@
           <a:p>
             <a:fld id="{A6139942-0A2E-443A-842F-D6DE74360370}" type="datetime1">
               <a:rPr lang="en-US" smtClean="0"/>
-              <a:t>1/8/20</a:t>
+              <a:t>1/8/2020</a:t>
             </a:fld>
             <a:endParaRPr lang="en-US" dirty="0"/>
           </a:p>
@@ -5267,7 +5269,7 @@
           <a:p>
             <a:fld id="{C50FD434-5945-4FAF-A8C0-DAE9905532CE}" type="datetimeFigureOut">
               <a:rPr lang="en-US" smtClean="0"/>
-              <a:t>1/8/20</a:t>
+              <a:t>1/8/2020</a:t>
             </a:fld>
             <a:endParaRPr lang="en-US"/>
           </a:p>
@@ -5737,7 +5739,7 @@
           <a:p>
             <a:fld id="{3F138946-C5C1-4A11-BA69-F12F43F8A94B}" type="datetime1">
               <a:rPr lang="en-US" smtClean="0"/>
-              <a:t>1/8/20</a:t>
+              <a:t>1/8/2020</a:t>
             </a:fld>
             <a:endParaRPr lang="en-US" dirty="0"/>
           </a:p>
@@ -6765,18 +6767,62 @@
         </p:nvSpPr>
         <p:spPr/>
         <p:txBody>
-          <a:bodyPr/>
+          <a:bodyPr>
+            <a:normAutofit fontScale="92500" lnSpcReduction="10000"/>
+          </a:bodyPr>
           <a:lstStyle/>
           <a:p>
             <a:r>
               <a:rPr lang="en-US" dirty="0"/>
-              <a:t>A major type of drawing used </a:t>
-            </a:r>
-            <a:r>
-              <a:rPr lang="en-US"/>
-              <a:t>in industry</a:t>
-            </a:r>
-            <a:endParaRPr lang="en-US" dirty="0"/>
+              <a:t>A dimension is for size and position (the design/modeled shape)</a:t>
+            </a:r>
+          </a:p>
+          <a:p>
+            <a:r>
+              <a:rPr lang="en-US" dirty="0"/>
+              <a:t>A dimension is a numerical value expressed in appropriate units of measurement and used to define the size, location, orientation, form or other geometric characteristics of a part</a:t>
+            </a:r>
+          </a:p>
+          <a:p>
+            <a:r>
+              <a:rPr lang="en-US" dirty="0"/>
+              <a:t>A method of communication to machinists in production</a:t>
+            </a:r>
+          </a:p>
+          <a:p>
+            <a:pPr lvl="1"/>
+            <a:r>
+              <a:rPr lang="en-US" dirty="0"/>
+              <a:t>Linear</a:t>
+            </a:r>
+          </a:p>
+          <a:p>
+            <a:pPr lvl="1"/>
+            <a:r>
+              <a:rPr lang="en-US" dirty="0"/>
+              <a:t>Aligned</a:t>
+            </a:r>
+          </a:p>
+          <a:p>
+            <a:pPr lvl="1"/>
+            <a:r>
+              <a:rPr lang="en-US" dirty="0"/>
+              <a:t>Angular</a:t>
+            </a:r>
+          </a:p>
+          <a:p>
+            <a:pPr lvl="1"/>
+            <a:r>
+              <a:rPr lang="en-US" dirty="0"/>
+              <a:t>Radius/Diameter</a:t>
+            </a:r>
+          </a:p>
+          <a:p>
+            <a:pPr lvl="1"/>
+            <a:r>
+              <a:rPr lang="en-US" dirty="0"/>
+              <a:t>Reference</a:t>
+            </a:r>
           </a:p>
         </p:txBody>
       </p:sp>
@@ -6821,6 +6867,420 @@
     <p:extLst>
       <p:ext uri="{BB962C8B-B14F-4D97-AF65-F5344CB8AC3E}">
         <p14:creationId xmlns:p14="http://schemas.microsoft.com/office/powerpoint/2010/main" val="4251624219"/>
+      </p:ext>
+    </p:extLst>
+  </p:cSld>
+  <p:clrMapOvr>
+    <a:masterClrMapping/>
+  </p:clrMapOvr>
+  <mc:AlternateContent xmlns:mc="http://schemas.openxmlformats.org/markup-compatibility/2006" xmlns:p14="http://schemas.microsoft.com/office/powerpoint/2010/main">
+    <mc:Choice Requires="p14">
+      <p:transition spd="med" p14:dur="700">
+        <p:fade/>
+      </p:transition>
+    </mc:Choice>
+    <mc:Fallback xmlns="">
+      <p:transition spd="med">
+        <p:fade/>
+      </p:transition>
+    </mc:Fallback>
+  </mc:AlternateContent>
+</p:sld>
+</file>
+
+<file path=ppt/slides/slide4.xml><?xml version="1.0" encoding="utf-8"?>
+<p:sld xmlns:a="http://schemas.openxmlformats.org/drawingml/2006/main" xmlns:r="http://schemas.openxmlformats.org/officeDocument/2006/relationships" xmlns:p="http://schemas.openxmlformats.org/presentationml/2006/main">
+  <p:cSld>
+    <p:bg>
+      <p:bgPr>
+        <a:gradFill rotWithShape="1">
+          <a:gsLst>
+            <a:gs pos="10000">
+              <a:schemeClr val="bg2">
+                <a:tint val="97000"/>
+                <a:hueMod val="92000"/>
+                <a:satMod val="169000"/>
+                <a:lumMod val="164000"/>
+              </a:schemeClr>
+            </a:gs>
+            <a:gs pos="100000">
+              <a:schemeClr val="bg2">
+                <a:shade val="96000"/>
+                <a:satMod val="120000"/>
+                <a:lumMod val="90000"/>
+              </a:schemeClr>
+            </a:gs>
+          </a:gsLst>
+          <a:lin ang="6120000" scaled="1"/>
+        </a:gradFill>
+        <a:effectLst/>
+      </p:bgPr>
+    </p:bg>
+    <p:spTree>
+      <p:nvGrpSpPr>
+        <p:cNvPr id="1" name=""/>
+        <p:cNvGrpSpPr/>
+        <p:nvPr/>
+      </p:nvGrpSpPr>
+      <p:grpSpPr>
+        <a:xfrm>
+          <a:off x="0" y="0"/>
+          <a:ext cx="0" cy="0"/>
+          <a:chOff x="0" y="0"/>
+          <a:chExt cx="0" cy="0"/>
+        </a:xfrm>
+      </p:grpSpPr>
+      <p:sp>
+        <p:nvSpPr>
+          <p:cNvPr id="10" name="Rectangle 9">
+            <a:extLst>
+              <a:ext uri="{FF2B5EF4-FFF2-40B4-BE49-F238E27FC236}">
+                <a16:creationId xmlns:a16="http://schemas.microsoft.com/office/drawing/2014/main" id="{391F240E-99C9-4C6A-BD0A-15F9E69F337F}"/>
+              </a:ext>
+              <a:ext uri="{C183D7F6-B498-43B3-948B-1728B52AA6E4}">
+                <adec:decorative xmlns:adec="http://schemas.microsoft.com/office/drawing/2017/decorative" val="1"/>
+              </a:ext>
+            </a:extLst>
+          </p:cNvPr>
+          <p:cNvSpPr>
+            <a:spLocks noGrp="1" noRot="1" noChangeAspect="1" noMove="1" noResize="1" noEditPoints="1" noAdjustHandles="1" noChangeArrowheads="1" noChangeShapeType="1" noTextEdit="1"/>
+          </p:cNvSpPr>
+          <p:nvPr>
+            <p:extLst>
+              <p:ext uri="{386F3935-93C4-4BCD-93E2-E3B085C9AB24}">
+                <p16:designElem xmlns:p16="http://schemas.microsoft.com/office/powerpoint/2015/main" val="1"/>
+              </p:ext>
+            </p:extLst>
+          </p:nvPr>
+        </p:nvSpPr>
+        <p:spPr>
+          <a:xfrm>
+            <a:off x="0" y="0"/>
+            <a:ext cx="12192000" cy="6858000"/>
+          </a:xfrm>
+          <a:prstGeom prst="rect">
+            <a:avLst/>
+          </a:prstGeom>
+          <a:ln>
+            <a:noFill/>
+          </a:ln>
+        </p:spPr>
+        <p:style>
+          <a:lnRef idx="2">
+            <a:schemeClr val="accent1">
+              <a:shade val="50000"/>
+            </a:schemeClr>
+          </a:lnRef>
+          <a:fillRef idx="1003">
+            <a:schemeClr val="lt1"/>
+          </a:fillRef>
+          <a:effectRef idx="0">
+            <a:schemeClr val="accent1"/>
+          </a:effectRef>
+          <a:fontRef idx="minor">
+            <a:schemeClr val="lt1"/>
+          </a:fontRef>
+        </p:style>
+        <p:txBody>
+          <a:bodyPr rtlCol="0" anchor="ctr"/>
+          <a:lstStyle/>
+          <a:p>
+            <a:pPr algn="ctr"/>
+            <a:endParaRPr lang="en-US"/>
+          </a:p>
+        </p:txBody>
+      </p:sp>
+      <p:sp>
+        <p:nvSpPr>
+          <p:cNvPr id="12" name="Rectangle 11">
+            <a:extLst>
+              <a:ext uri="{FF2B5EF4-FFF2-40B4-BE49-F238E27FC236}">
+                <a16:creationId xmlns:a16="http://schemas.microsoft.com/office/drawing/2014/main" id="{9C8424AD-EE61-4FBC-ABA0-36E67508F2D0}"/>
+              </a:ext>
+              <a:ext uri="{C183D7F6-B498-43B3-948B-1728B52AA6E4}">
+                <adec:decorative xmlns:adec="http://schemas.microsoft.com/office/drawing/2017/decorative" val="1"/>
+              </a:ext>
+            </a:extLst>
+          </p:cNvPr>
+          <p:cNvSpPr>
+            <a:spLocks noGrp="1" noRot="1" noChangeAspect="1" noMove="1" noResize="1" noEditPoints="1" noAdjustHandles="1" noChangeArrowheads="1" noChangeShapeType="1" noTextEdit="1"/>
+          </p:cNvSpPr>
+          <p:nvPr>
+            <p:extLst>
+              <p:ext uri="{386F3935-93C4-4BCD-93E2-E3B085C9AB24}">
+                <p16:designElem xmlns:p16="http://schemas.microsoft.com/office/powerpoint/2015/main" val="1"/>
+              </p:ext>
+            </p:extLst>
+          </p:nvPr>
+        </p:nvSpPr>
+        <p:spPr>
+          <a:xfrm>
+            <a:off x="477012" y="480060"/>
+            <a:ext cx="11237976" cy="5897880"/>
+          </a:xfrm>
+          <a:prstGeom prst="rect">
+            <a:avLst/>
+          </a:prstGeom>
+          <a:solidFill>
+            <a:srgbClr val="FFFFFF"/>
+          </a:solidFill>
+          <a:ln w="22225" cap="sq">
+            <a:solidFill>
+              <a:schemeClr val="accent1"/>
+            </a:solidFill>
+            <a:miter lim="800000"/>
+          </a:ln>
+        </p:spPr>
+        <p:style>
+          <a:lnRef idx="2">
+            <a:schemeClr val="accent1">
+              <a:shade val="50000"/>
+            </a:schemeClr>
+          </a:lnRef>
+          <a:fillRef idx="1">
+            <a:schemeClr val="accent1"/>
+          </a:fillRef>
+          <a:effectRef idx="0">
+            <a:schemeClr val="accent1"/>
+          </a:effectRef>
+          <a:fontRef idx="minor">
+            <a:schemeClr val="lt1"/>
+          </a:fontRef>
+        </p:style>
+        <p:txBody>
+          <a:bodyPr rtlCol="0" anchor="ctr"/>
+          <a:lstStyle/>
+          <a:p>
+            <a:pPr algn="ctr"/>
+            <a:endParaRPr lang="en-US"/>
+          </a:p>
+        </p:txBody>
+      </p:sp>
+      <p:pic>
+        <p:nvPicPr>
+          <p:cNvPr id="5" name="Picture 4" descr="A close up of a map&#10;&#10;Description automatically generated">
+            <a:extLst>
+              <a:ext uri="{FF2B5EF4-FFF2-40B4-BE49-F238E27FC236}">
+                <a16:creationId xmlns:a16="http://schemas.microsoft.com/office/drawing/2014/main" id="{D594C8FC-D908-4BFE-99DF-7DAA23DBA058}"/>
+              </a:ext>
+            </a:extLst>
+          </p:cNvPr>
+          <p:cNvPicPr>
+            <a:picLocks noChangeAspect="1"/>
+          </p:cNvPicPr>
+          <p:nvPr/>
+        </p:nvPicPr>
+        <p:blipFill>
+          <a:blip r:embed="rId2"/>
+          <a:stretch>
+            <a:fillRect/>
+          </a:stretch>
+        </p:blipFill>
+        <p:spPr>
+          <a:xfrm>
+            <a:off x="2561470" y="954829"/>
+            <a:ext cx="7069061" cy="4948342"/>
+          </a:xfrm>
+          <a:prstGeom prst="rect">
+            <a:avLst/>
+          </a:prstGeom>
+        </p:spPr>
+      </p:pic>
+      <p:sp>
+        <p:nvSpPr>
+          <p:cNvPr id="4" name="Footer Placeholder 3">
+            <a:extLst>
+              <a:ext uri="{FF2B5EF4-FFF2-40B4-BE49-F238E27FC236}">
+                <a16:creationId xmlns:a16="http://schemas.microsoft.com/office/drawing/2014/main" id="{0EABF712-DECE-4130-945D-18361DC1AAE8}"/>
+              </a:ext>
+            </a:extLst>
+          </p:cNvPr>
+          <p:cNvSpPr>
+            <a:spLocks noGrp="1"/>
+          </p:cNvSpPr>
+          <p:nvPr>
+            <p:ph type="ftr" sz="quarter" idx="11"/>
+          </p:nvPr>
+        </p:nvSpPr>
+        <p:spPr>
+          <a:xfrm>
+            <a:off x="684212" y="6397307"/>
+            <a:ext cx="7543800" cy="365125"/>
+          </a:xfrm>
+        </p:spPr>
+        <p:txBody>
+          <a:bodyPr>
+            <a:normAutofit/>
+          </a:bodyPr>
+          <a:lstStyle/>
+          <a:p>
+            <a:pPr>
+              <a:spcAft>
+                <a:spcPts val="600"/>
+              </a:spcAft>
+            </a:pPr>
+            <a:r>
+              <a:rPr lang="en-US"/>
+              <a:t>Unit 7 – Section 1 - Day 1</a:t>
+            </a:r>
+          </a:p>
+          <a:p>
+            <a:pPr>
+              <a:spcAft>
+                <a:spcPts val="600"/>
+              </a:spcAft>
+            </a:pPr>
+            <a:endParaRPr lang="en-US"/>
+          </a:p>
+        </p:txBody>
+      </p:sp>
+    </p:spTree>
+    <p:extLst>
+      <p:ext uri="{BB962C8B-B14F-4D97-AF65-F5344CB8AC3E}">
+        <p14:creationId xmlns:p14="http://schemas.microsoft.com/office/powerpoint/2010/main" val="1122692373"/>
+      </p:ext>
+    </p:extLst>
+  </p:cSld>
+  <p:clrMapOvr>
+    <a:masterClrMapping/>
+  </p:clrMapOvr>
+  <mc:AlternateContent xmlns:mc="http://schemas.openxmlformats.org/markup-compatibility/2006" xmlns:p14="http://schemas.microsoft.com/office/powerpoint/2010/main">
+    <mc:Choice Requires="p14">
+      <p:transition spd="med" p14:dur="700">
+        <p:fade/>
+      </p:transition>
+    </mc:Choice>
+    <mc:Fallback xmlns="">
+      <p:transition spd="med">
+        <p:fade/>
+      </p:transition>
+    </mc:Fallback>
+  </mc:AlternateContent>
+</p:sld>
+</file>
+
+<file path=ppt/slides/slide5.xml><?xml version="1.0" encoding="utf-8"?>
+<p:sld xmlns:a="http://schemas.openxmlformats.org/drawingml/2006/main" xmlns:r="http://schemas.openxmlformats.org/officeDocument/2006/relationships" xmlns:p="http://schemas.openxmlformats.org/presentationml/2006/main">
+  <p:cSld>
+    <p:spTree>
+      <p:nvGrpSpPr>
+        <p:cNvPr id="1" name=""/>
+        <p:cNvGrpSpPr/>
+        <p:nvPr/>
+      </p:nvGrpSpPr>
+      <p:grpSpPr>
+        <a:xfrm>
+          <a:off x="0" y="0"/>
+          <a:ext cx="0" cy="0"/>
+          <a:chOff x="0" y="0"/>
+          <a:chExt cx="0" cy="0"/>
+        </a:xfrm>
+      </p:grpSpPr>
+      <p:sp>
+        <p:nvSpPr>
+          <p:cNvPr id="2" name="Title 1">
+            <a:extLst>
+              <a:ext uri="{FF2B5EF4-FFF2-40B4-BE49-F238E27FC236}">
+                <a16:creationId xmlns:a16="http://schemas.microsoft.com/office/drawing/2014/main" id="{1FF8590C-0CF8-46FE-AA7B-736D0ED7233F}"/>
+              </a:ext>
+            </a:extLst>
+          </p:cNvPr>
+          <p:cNvSpPr>
+            <a:spLocks noGrp="1"/>
+          </p:cNvSpPr>
+          <p:nvPr>
+            <p:ph type="title"/>
+          </p:nvPr>
+        </p:nvSpPr>
+        <p:spPr/>
+        <p:txBody>
+          <a:bodyPr/>
+          <a:lstStyle/>
+          <a:p>
+            <a:r>
+              <a:rPr lang="en-US" dirty="0"/>
+              <a:t>UNITS OF MEASURE</a:t>
+            </a:r>
+          </a:p>
+        </p:txBody>
+      </p:sp>
+      <p:sp>
+        <p:nvSpPr>
+          <p:cNvPr id="3" name="Content Placeholder 2">
+            <a:extLst>
+              <a:ext uri="{FF2B5EF4-FFF2-40B4-BE49-F238E27FC236}">
+                <a16:creationId xmlns:a16="http://schemas.microsoft.com/office/drawing/2014/main" id="{1F9B70FE-72EF-4757-97CF-3C2542F11181}"/>
+              </a:ext>
+            </a:extLst>
+          </p:cNvPr>
+          <p:cNvSpPr>
+            <a:spLocks noGrp="1"/>
+          </p:cNvSpPr>
+          <p:nvPr>
+            <p:ph idx="1"/>
+          </p:nvPr>
+        </p:nvSpPr>
+        <p:spPr/>
+        <p:txBody>
+          <a:bodyPr>
+            <a:normAutofit/>
+          </a:bodyPr>
+          <a:lstStyle/>
+          <a:p>
+            <a:r>
+              <a:rPr lang="en-US" dirty="0"/>
+              <a:t>Decimal inches (preferred), fractional inches, feet and fractional inches</a:t>
+            </a:r>
+          </a:p>
+          <a:p>
+            <a:r>
+              <a:rPr lang="en-US" dirty="0"/>
+              <a:t>SI or metric – millimeter (mm)</a:t>
+            </a:r>
+          </a:p>
+        </p:txBody>
+      </p:sp>
+      <p:sp>
+        <p:nvSpPr>
+          <p:cNvPr id="4" name="Footer Placeholder 3">
+            <a:extLst>
+              <a:ext uri="{FF2B5EF4-FFF2-40B4-BE49-F238E27FC236}">
+                <a16:creationId xmlns:a16="http://schemas.microsoft.com/office/drawing/2014/main" id="{0EABF712-DECE-4130-945D-18361DC1AAE8}"/>
+              </a:ext>
+            </a:extLst>
+          </p:cNvPr>
+          <p:cNvSpPr>
+            <a:spLocks noGrp="1"/>
+          </p:cNvSpPr>
+          <p:nvPr>
+            <p:ph type="ftr" sz="quarter" idx="11"/>
+          </p:nvPr>
+        </p:nvSpPr>
+        <p:spPr/>
+        <p:txBody>
+          <a:bodyPr/>
+          <a:lstStyle/>
+          <a:p>
+            <a:r>
+              <a:rPr lang="en-US" dirty="0">
+                <a:solidFill>
+                  <a:schemeClr val="tx1">
+                    <a:alpha val="80000"/>
+                  </a:schemeClr>
+                </a:solidFill>
+              </a:rPr>
+              <a:t>Unit 7 – Section 1 - Day 1</a:t>
+            </a:r>
+          </a:p>
+          <a:p>
+            <a:endParaRPr lang="en-US" dirty="0"/>
+          </a:p>
+        </p:txBody>
+      </p:sp>
+    </p:spTree>
+    <p:extLst>
+      <p:ext uri="{BB962C8B-B14F-4D97-AF65-F5344CB8AC3E}">
+        <p14:creationId xmlns:p14="http://schemas.microsoft.com/office/powerpoint/2010/main" val="2117218908"/>
       </p:ext>
     </p:extLst>
   </p:cSld>

</xml_diff>